<commit_message>
Update alignment in PowerPoint generation script
</commit_message>
<xml_diff>
--- a/貨架借用表.pptx
+++ b/貨架借用表.pptx
@@ -3146,7 +3146,7 @@
                 <a:gridCol w="1045028"/>
                 <a:gridCol w="1045032"/>
               </a:tblGrid>
-              <a:tr h="457200">
+              <a:tr h="762000">
                 <a:tc>
                   <a:txBody>
                     <a:bodyPr/>
@@ -3253,7 +3253,7 @@
                   <a:tcPr/>
                 </a:tc>
               </a:tr>
-              <a:tr h="457200">
+              <a:tr h="762000">
                 <a:tc>
                   <a:txBody>
                     <a:bodyPr/>
@@ -3263,7 +3263,7 @@
                         <a:defRPr sz="1000"/>
                       </a:pPr>
                       <a:r>
-                        <a:t>27893.0</a:t>
+                        <a:t>27893</a:t>
                       </a:r>
                     </a:p>
                   </a:txBody>
@@ -3293,7 +3293,7 @@
                         <a:defRPr sz="1000"/>
                       </a:pPr>
                       <a:r>
-                        <a:t>7.0</a:t>
+                        <a:t>7</a:t>
                       </a:r>
                     </a:p>
                   </a:txBody>
@@ -3353,14 +3353,14 @@
                         <a:defRPr sz="1000"/>
                       </a:pPr>
                       <a:r>
-                        <a:t>2024-11-22 14:29:22.540000</a:t>
+                        <a:t>2024-11-22 15:31:25.160000</a:t>
                       </a:r>
                     </a:p>
                   </a:txBody>
                   <a:tcPr/>
                 </a:tc>
               </a:tr>
-              <a:tr h="457200">
+              <a:tr h="762000">
                 <a:tc>
                   <a:txBody>
                     <a:bodyPr/>
@@ -3370,7 +3370,7 @@
                         <a:defRPr sz="1000"/>
                       </a:pPr>
                       <a:r>
-                        <a:t>10941.0</a:t>
+                        <a:t>10941</a:t>
                       </a:r>
                     </a:p>
                   </a:txBody>
@@ -3400,7 +3400,7 @@
                         <a:defRPr sz="1000"/>
                       </a:pPr>
                       <a:r>
-                        <a:t>12.0</a:t>
+                        <a:t>12</a:t>
                       </a:r>
                     </a:p>
                   </a:txBody>
@@ -3460,14 +3460,14 @@
                         <a:defRPr sz="1000"/>
                       </a:pPr>
                       <a:r>
-                        <a:t>2024-11-22 14:29:22.540000</a:t>
+                        <a:t>2024-11-22 15:31:25.160000</a:t>
                       </a:r>
                     </a:p>
                   </a:txBody>
                   <a:tcPr/>
                 </a:tc>
               </a:tr>
-              <a:tr h="457200">
+              <a:tr h="762000">
                 <a:tc>
                   <a:txBody>
                     <a:bodyPr/>
@@ -3477,7 +3477,7 @@
                         <a:defRPr sz="1000"/>
                       </a:pPr>
                       <a:r>
-                        <a:t>19103.0</a:t>
+                        <a:t>19103</a:t>
                       </a:r>
                     </a:p>
                   </a:txBody>
@@ -3507,7 +3507,7 @@
                         <a:defRPr sz="1000"/>
                       </a:pPr>
                       <a:r>
-                        <a:t>20.0</a:t>
+                        <a:t>20</a:t>
                       </a:r>
                     </a:p>
                   </a:txBody>
@@ -3567,14 +3567,14 @@
                         <a:defRPr sz="1000"/>
                       </a:pPr>
                       <a:r>
-                        <a:t>2024-11-22 14:29:22.540000</a:t>
+                        <a:t>2024-11-22 15:31:25.160000</a:t>
                       </a:r>
                     </a:p>
                   </a:txBody>
                   <a:tcPr/>
                 </a:tc>
               </a:tr>
-              <a:tr h="457200">
+              <a:tr h="762000">
                 <a:tc>
                   <a:txBody>
                     <a:bodyPr/>
@@ -3584,7 +3584,7 @@
                         <a:defRPr sz="1000"/>
                       </a:pPr>
                       <a:r>
-                        <a:t>27899.0</a:t>
+                        <a:t>27899</a:t>
                       </a:r>
                     </a:p>
                   </a:txBody>
@@ -3614,7 +3614,7 @@
                         <a:defRPr sz="1000"/>
                       </a:pPr>
                       <a:r>
-                        <a:t>10.0</a:t>
+                        <a:t>10</a:t>
                       </a:r>
                     </a:p>
                   </a:txBody>
@@ -3674,14 +3674,14 @@
                         <a:defRPr sz="1000"/>
                       </a:pPr>
                       <a:r>
-                        <a:t>2024-11-22 14:29:22.540000</a:t>
+                        <a:t>2024-11-22 15:31:25.160000</a:t>
                       </a:r>
                     </a:p>
                   </a:txBody>
                   <a:tcPr/>
                 </a:tc>
               </a:tr>
-              <a:tr h="457200">
+              <a:tr h="762000">
                 <a:tc>
                   <a:txBody>
                     <a:bodyPr/>
@@ -3691,7 +3691,7 @@
                         <a:defRPr sz="1000"/>
                       </a:pPr>
                       <a:r>
-                        <a:t>10642.0</a:t>
+                        <a:t>10642</a:t>
                       </a:r>
                     </a:p>
                   </a:txBody>
@@ -3721,7 +3721,7 @@
                         <a:defRPr sz="1000"/>
                       </a:pPr>
                       <a:r>
-                        <a:t>10.0</a:t>
+                        <a:t>10</a:t>
                       </a:r>
                     </a:p>
                   </a:txBody>
@@ -3781,435 +3781,7 @@
                         <a:defRPr sz="1000"/>
                       </a:pPr>
                       <a:r>
-                        <a:t>2024-11-22 14:29:22.540000</a:t>
-                      </a:r>
-                    </a:p>
-                  </a:txBody>
-                  <a:tcPr/>
-                </a:tc>
-              </a:tr>
-              <a:tr h="457200">
-                <a:tc>
-                  <a:txBody>
-                    <a:bodyPr/>
-                    <a:lstStyle/>
-                    <a:p>
-                      <a:pPr algn="ctr">
-                        <a:defRPr sz="1000"/>
-                      </a:pPr>
-                      <a:r>
-                        <a:t>nan</a:t>
-                      </a:r>
-                    </a:p>
-                  </a:txBody>
-                  <a:tcPr/>
-                </a:tc>
-                <a:tc>
-                  <a:txBody>
-                    <a:bodyPr/>
-                    <a:lstStyle/>
-                    <a:p>
-                      <a:pPr algn="ctr">
-                        <a:defRPr sz="1000"/>
-                      </a:pPr>
-                      <a:r>
-                        <a:t>貨號輸入錯啦，請輸入正確貨號。</a:t>
-                      </a:r>
-                    </a:p>
-                  </a:txBody>
-                  <a:tcPr/>
-                </a:tc>
-                <a:tc>
-                  <a:txBody>
-                    <a:bodyPr/>
-                    <a:lstStyle/>
-                    <a:p>
-                      <a:pPr algn="ctr">
-                        <a:defRPr sz="1000"/>
-                      </a:pPr>
-                      <a:r>
-                        <a:t>nan</a:t>
-                      </a:r>
-                    </a:p>
-                  </a:txBody>
-                  <a:tcPr/>
-                </a:tc>
-                <a:tc>
-                  <a:txBody>
-                    <a:bodyPr/>
-                    <a:lstStyle/>
-                    <a:p>
-                      <a:pPr algn="ctr">
-                        <a:defRPr sz="1000"/>
-                      </a:pPr>
-                      <a:r>
-                        <a:t>nan</a:t>
-                      </a:r>
-                    </a:p>
-                  </a:txBody>
-                  <a:tcPr/>
-                </a:tc>
-                <a:tc>
-                  <a:txBody>
-                    <a:bodyPr/>
-                    <a:lstStyle/>
-                    <a:p>
-                      <a:pPr algn="ctr">
-                        <a:defRPr sz="1000"/>
-                      </a:pPr>
-                      <a:r>
-                        <a:t>nan</a:t>
-                      </a:r>
-                    </a:p>
-                  </a:txBody>
-                  <a:tcPr/>
-                </a:tc>
-                <a:tc>
-                  <a:txBody>
-                    <a:bodyPr/>
-                    <a:lstStyle/>
-                    <a:p>
-                      <a:pPr algn="ctr">
-                        <a:defRPr sz="1000"/>
-                      </a:pPr>
-                      <a:r>
-                        <a:t>nan</a:t>
-                      </a:r>
-                    </a:p>
-                  </a:txBody>
-                  <a:tcPr/>
-                </a:tc>
-                <a:tc>
-                  <a:txBody>
-                    <a:bodyPr/>
-                    <a:lstStyle/>
-                    <a:p>
-                      <a:pPr algn="ctr">
-                        <a:defRPr sz="1000"/>
-                      </a:pPr>
-                      <a:r>
-                        <a:t>NaT</a:t>
-                      </a:r>
-                    </a:p>
-                  </a:txBody>
-                  <a:tcPr/>
-                </a:tc>
-              </a:tr>
-              <a:tr h="457200">
-                <a:tc>
-                  <a:txBody>
-                    <a:bodyPr/>
-                    <a:lstStyle/>
-                    <a:p>
-                      <a:pPr algn="ctr">
-                        <a:defRPr sz="1000"/>
-                      </a:pPr>
-                      <a:r>
-                        <a:t>nan</a:t>
-                      </a:r>
-                    </a:p>
-                  </a:txBody>
-                  <a:tcPr/>
-                </a:tc>
-                <a:tc>
-                  <a:txBody>
-                    <a:bodyPr/>
-                    <a:lstStyle/>
-                    <a:p>
-                      <a:pPr algn="ctr">
-                        <a:defRPr sz="1000"/>
-                      </a:pPr>
-                      <a:r>
-                        <a:t>貨號輸入錯啦，請輸入正確貨號。</a:t>
-                      </a:r>
-                    </a:p>
-                  </a:txBody>
-                  <a:tcPr/>
-                </a:tc>
-                <a:tc>
-                  <a:txBody>
-                    <a:bodyPr/>
-                    <a:lstStyle/>
-                    <a:p>
-                      <a:pPr algn="ctr">
-                        <a:defRPr sz="1000"/>
-                      </a:pPr>
-                      <a:r>
-                        <a:t>nan</a:t>
-                      </a:r>
-                    </a:p>
-                  </a:txBody>
-                  <a:tcPr/>
-                </a:tc>
-                <a:tc>
-                  <a:txBody>
-                    <a:bodyPr/>
-                    <a:lstStyle/>
-                    <a:p>
-                      <a:pPr algn="ctr">
-                        <a:defRPr sz="1000"/>
-                      </a:pPr>
-                      <a:r>
-                        <a:t>nan</a:t>
-                      </a:r>
-                    </a:p>
-                  </a:txBody>
-                  <a:tcPr/>
-                </a:tc>
-                <a:tc>
-                  <a:txBody>
-                    <a:bodyPr/>
-                    <a:lstStyle/>
-                    <a:p>
-                      <a:pPr algn="ctr">
-                        <a:defRPr sz="1000"/>
-                      </a:pPr>
-                      <a:r>
-                        <a:t>nan</a:t>
-                      </a:r>
-                    </a:p>
-                  </a:txBody>
-                  <a:tcPr/>
-                </a:tc>
-                <a:tc>
-                  <a:txBody>
-                    <a:bodyPr/>
-                    <a:lstStyle/>
-                    <a:p>
-                      <a:pPr algn="ctr">
-                        <a:defRPr sz="1000"/>
-                      </a:pPr>
-                      <a:r>
-                        <a:t>nan</a:t>
-                      </a:r>
-                    </a:p>
-                  </a:txBody>
-                  <a:tcPr/>
-                </a:tc>
-                <a:tc>
-                  <a:txBody>
-                    <a:bodyPr/>
-                    <a:lstStyle/>
-                    <a:p>
-                      <a:pPr algn="ctr">
-                        <a:defRPr sz="1000"/>
-                      </a:pPr>
-                      <a:r>
-                        <a:t>NaT</a:t>
-                      </a:r>
-                    </a:p>
-                  </a:txBody>
-                  <a:tcPr/>
-                </a:tc>
-              </a:tr>
-              <a:tr h="457200">
-                <a:tc>
-                  <a:txBody>
-                    <a:bodyPr/>
-                    <a:lstStyle/>
-                    <a:p>
-                      <a:pPr algn="ctr">
-                        <a:defRPr sz="1000"/>
-                      </a:pPr>
-                      <a:r>
-                        <a:t>nan</a:t>
-                      </a:r>
-                    </a:p>
-                  </a:txBody>
-                  <a:tcPr/>
-                </a:tc>
-                <a:tc>
-                  <a:txBody>
-                    <a:bodyPr/>
-                    <a:lstStyle/>
-                    <a:p>
-                      <a:pPr algn="ctr">
-                        <a:defRPr sz="1000"/>
-                      </a:pPr>
-                      <a:r>
-                        <a:t>貨號輸入錯啦，請輸入正確貨號。</a:t>
-                      </a:r>
-                    </a:p>
-                  </a:txBody>
-                  <a:tcPr/>
-                </a:tc>
-                <a:tc>
-                  <a:txBody>
-                    <a:bodyPr/>
-                    <a:lstStyle/>
-                    <a:p>
-                      <a:pPr algn="ctr">
-                        <a:defRPr sz="1000"/>
-                      </a:pPr>
-                      <a:r>
-                        <a:t>nan</a:t>
-                      </a:r>
-                    </a:p>
-                  </a:txBody>
-                  <a:tcPr/>
-                </a:tc>
-                <a:tc>
-                  <a:txBody>
-                    <a:bodyPr/>
-                    <a:lstStyle/>
-                    <a:p>
-                      <a:pPr algn="ctr">
-                        <a:defRPr sz="1000"/>
-                      </a:pPr>
-                      <a:r>
-                        <a:t>nan</a:t>
-                      </a:r>
-                    </a:p>
-                  </a:txBody>
-                  <a:tcPr/>
-                </a:tc>
-                <a:tc>
-                  <a:txBody>
-                    <a:bodyPr/>
-                    <a:lstStyle/>
-                    <a:p>
-                      <a:pPr algn="ctr">
-                        <a:defRPr sz="1000"/>
-                      </a:pPr>
-                      <a:r>
-                        <a:t>nan</a:t>
-                      </a:r>
-                    </a:p>
-                  </a:txBody>
-                  <a:tcPr/>
-                </a:tc>
-                <a:tc>
-                  <a:txBody>
-                    <a:bodyPr/>
-                    <a:lstStyle/>
-                    <a:p>
-                      <a:pPr algn="ctr">
-                        <a:defRPr sz="1000"/>
-                      </a:pPr>
-                      <a:r>
-                        <a:t>nan</a:t>
-                      </a:r>
-                    </a:p>
-                  </a:txBody>
-                  <a:tcPr/>
-                </a:tc>
-                <a:tc>
-                  <a:txBody>
-                    <a:bodyPr/>
-                    <a:lstStyle/>
-                    <a:p>
-                      <a:pPr algn="ctr">
-                        <a:defRPr sz="1000"/>
-                      </a:pPr>
-                      <a:r>
-                        <a:t>NaT</a:t>
-                      </a:r>
-                    </a:p>
-                  </a:txBody>
-                  <a:tcPr/>
-                </a:tc>
-              </a:tr>
-              <a:tr h="457200">
-                <a:tc>
-                  <a:txBody>
-                    <a:bodyPr/>
-                    <a:lstStyle/>
-                    <a:p>
-                      <a:pPr algn="ctr">
-                        <a:defRPr sz="1000"/>
-                      </a:pPr>
-                      <a:r>
-                        <a:t>nan</a:t>
-                      </a:r>
-                    </a:p>
-                  </a:txBody>
-                  <a:tcPr/>
-                </a:tc>
-                <a:tc>
-                  <a:txBody>
-                    <a:bodyPr/>
-                    <a:lstStyle/>
-                    <a:p>
-                      <a:pPr algn="ctr">
-                        <a:defRPr sz="1000"/>
-                      </a:pPr>
-                      <a:r>
-                        <a:t>貨號輸入錯啦，請輸入正確貨號。</a:t>
-                      </a:r>
-                    </a:p>
-                  </a:txBody>
-                  <a:tcPr/>
-                </a:tc>
-                <a:tc>
-                  <a:txBody>
-                    <a:bodyPr/>
-                    <a:lstStyle/>
-                    <a:p>
-                      <a:pPr algn="ctr">
-                        <a:defRPr sz="1000"/>
-                      </a:pPr>
-                      <a:r>
-                        <a:t>nan</a:t>
-                      </a:r>
-                    </a:p>
-                  </a:txBody>
-                  <a:tcPr/>
-                </a:tc>
-                <a:tc>
-                  <a:txBody>
-                    <a:bodyPr/>
-                    <a:lstStyle/>
-                    <a:p>
-                      <a:pPr algn="ctr">
-                        <a:defRPr sz="1000"/>
-                      </a:pPr>
-                      <a:r>
-                        <a:t>nan</a:t>
-                      </a:r>
-                    </a:p>
-                  </a:txBody>
-                  <a:tcPr/>
-                </a:tc>
-                <a:tc>
-                  <a:txBody>
-                    <a:bodyPr/>
-                    <a:lstStyle/>
-                    <a:p>
-                      <a:pPr algn="ctr">
-                        <a:defRPr sz="1000"/>
-                      </a:pPr>
-                      <a:r>
-                        <a:t>nan</a:t>
-                      </a:r>
-                    </a:p>
-                  </a:txBody>
-                  <a:tcPr/>
-                </a:tc>
-                <a:tc>
-                  <a:txBody>
-                    <a:bodyPr/>
-                    <a:lstStyle/>
-                    <a:p>
-                      <a:pPr algn="ctr">
-                        <a:defRPr sz="1000"/>
-                      </a:pPr>
-                      <a:r>
-                        <a:t>nan</a:t>
-                      </a:r>
-                    </a:p>
-                  </a:txBody>
-                  <a:tcPr/>
-                </a:tc>
-                <a:tc>
-                  <a:txBody>
-                    <a:bodyPr/>
-                    <a:lstStyle/>
-                    <a:p>
-                      <a:pPr algn="ctr">
-                        <a:defRPr sz="1000"/>
-                      </a:pPr>
-                      <a:r>
-                        <a:t>NaT</a:t>
+                        <a:t>2024-11-22 15:31:25.160000</a:t>
                       </a:r>
                     </a:p>
                   </a:txBody>

</xml_diff>